<commit_message>
Sense script and presentation improvements
</commit_message>
<xml_diff>
--- a/etc/elastic.pptx
+++ b/etc/elastic.pptx
@@ -640,7 +640,7 @@
             <a:fld id="{B61BEF0D-F0BB-DE4B-95CE-6DB70DBA9567}" type="datetimeFigureOut">
               <a:rPr lang="en-US" dirty="0"/>
               <a:pPr/>
-              <a:t>7/9/2016</a:t>
+              <a:t>7/10/2016</a:t>
             </a:fld>
             <a:endParaRPr lang="en-US" dirty="0"/>
           </a:p>
@@ -933,7 +933,7 @@
             <a:fld id="{B61BEF0D-F0BB-DE4B-95CE-6DB70DBA9567}" type="datetimeFigureOut">
               <a:rPr lang="en-US" dirty="0"/>
               <a:pPr/>
-              <a:t>7/9/2016</a:t>
+              <a:t>7/10/2016</a:t>
             </a:fld>
             <a:endParaRPr lang="en-US" dirty="0"/>
           </a:p>
@@ -1178,7 +1178,7 @@
             <a:fld id="{B61BEF0D-F0BB-DE4B-95CE-6DB70DBA9567}" type="datetimeFigureOut">
               <a:rPr lang="en-US" dirty="0"/>
               <a:pPr/>
-              <a:t>7/9/2016</a:t>
+              <a:t>7/10/2016</a:t>
             </a:fld>
             <a:endParaRPr lang="en-US" dirty="0"/>
           </a:p>
@@ -1715,7 +1715,7 @@
             <a:fld id="{B61BEF0D-F0BB-DE4B-95CE-6DB70DBA9567}" type="datetimeFigureOut">
               <a:rPr lang="en-US" dirty="0"/>
               <a:pPr/>
-              <a:t>7/9/2016</a:t>
+              <a:t>7/10/2016</a:t>
             </a:fld>
             <a:endParaRPr lang="en-US" dirty="0"/>
           </a:p>
@@ -1960,7 +1960,7 @@
             <a:fld id="{B61BEF0D-F0BB-DE4B-95CE-6DB70DBA9567}" type="datetimeFigureOut">
               <a:rPr lang="en-US" dirty="0"/>
               <a:pPr/>
-              <a:t>7/9/2016</a:t>
+              <a:t>7/10/2016</a:t>
             </a:fld>
             <a:endParaRPr lang="en-US" dirty="0"/>
           </a:p>
@@ -2489,7 +2489,7 @@
             <a:fld id="{B61BEF0D-F0BB-DE4B-95CE-6DB70DBA9567}" type="datetimeFigureOut">
               <a:rPr lang="en-US" dirty="0"/>
               <a:pPr/>
-              <a:t>7/9/2016</a:t>
+              <a:t>7/10/2016</a:t>
             </a:fld>
             <a:endParaRPr lang="en-US" dirty="0"/>
           </a:p>
@@ -2783,7 +2783,7 @@
             <a:fld id="{B61BEF0D-F0BB-DE4B-95CE-6DB70DBA9567}" type="datetimeFigureOut">
               <a:rPr lang="en-US" dirty="0"/>
               <a:pPr/>
-              <a:t>7/9/2016</a:t>
+              <a:t>7/10/2016</a:t>
             </a:fld>
             <a:endParaRPr lang="en-US" dirty="0"/>
           </a:p>
@@ -2954,7 +2954,7 @@
             <a:fld id="{B61BEF0D-F0BB-DE4B-95CE-6DB70DBA9567}" type="datetimeFigureOut">
               <a:rPr lang="en-US" dirty="0"/>
               <a:pPr/>
-              <a:t>7/9/2016</a:t>
+              <a:t>7/10/2016</a:t>
             </a:fld>
             <a:endParaRPr lang="en-US" dirty="0"/>
           </a:p>
@@ -3131,7 +3131,7 @@
             <a:fld id="{B61BEF0D-F0BB-DE4B-95CE-6DB70DBA9567}" type="datetimeFigureOut">
               <a:rPr lang="en-US" dirty="0"/>
               <a:pPr/>
-              <a:t>7/9/2016</a:t>
+              <a:t>7/10/2016</a:t>
             </a:fld>
             <a:endParaRPr lang="en-US" dirty="0"/>
           </a:p>
@@ -3298,7 +3298,7 @@
             <a:fld id="{B61BEF0D-F0BB-DE4B-95CE-6DB70DBA9567}" type="datetimeFigureOut">
               <a:rPr lang="en-US" dirty="0"/>
               <a:pPr/>
-              <a:t>7/9/2016</a:t>
+              <a:t>7/10/2016</a:t>
             </a:fld>
             <a:endParaRPr lang="en-US" dirty="0"/>
           </a:p>
@@ -3546,7 +3546,7 @@
             <a:fld id="{B61BEF0D-F0BB-DE4B-95CE-6DB70DBA9567}" type="datetimeFigureOut">
               <a:rPr lang="en-US" dirty="0"/>
               <a:pPr/>
-              <a:t>7/9/2016</a:t>
+              <a:t>7/10/2016</a:t>
             </a:fld>
             <a:endParaRPr lang="en-US" dirty="0"/>
           </a:p>
@@ -3840,7 +3840,7 @@
             <a:fld id="{B61BEF0D-F0BB-DE4B-95CE-6DB70DBA9567}" type="datetimeFigureOut">
               <a:rPr lang="en-US" dirty="0"/>
               <a:pPr/>
-              <a:t>7/9/2016</a:t>
+              <a:t>7/10/2016</a:t>
             </a:fld>
             <a:endParaRPr lang="en-US" dirty="0"/>
           </a:p>
@@ -4279,7 +4279,7 @@
             <a:fld id="{B61BEF0D-F0BB-DE4B-95CE-6DB70DBA9567}" type="datetimeFigureOut">
               <a:rPr lang="en-US" dirty="0"/>
               <a:pPr/>
-              <a:t>7/9/2016</a:t>
+              <a:t>7/10/2016</a:t>
             </a:fld>
             <a:endParaRPr lang="en-US" dirty="0"/>
           </a:p>
@@ -4394,7 +4394,7 @@
             <a:fld id="{B61BEF0D-F0BB-DE4B-95CE-6DB70DBA9567}" type="datetimeFigureOut">
               <a:rPr lang="en-US" dirty="0"/>
               <a:pPr/>
-              <a:t>7/9/2016</a:t>
+              <a:t>7/10/2016</a:t>
             </a:fld>
             <a:endParaRPr lang="en-US" dirty="0"/>
           </a:p>
@@ -4486,7 +4486,7 @@
             <a:fld id="{B61BEF0D-F0BB-DE4B-95CE-6DB70DBA9567}" type="datetimeFigureOut">
               <a:rPr lang="en-US" dirty="0"/>
               <a:pPr/>
-              <a:t>7/9/2016</a:t>
+              <a:t>7/10/2016</a:t>
             </a:fld>
             <a:endParaRPr lang="en-US" dirty="0"/>
           </a:p>
@@ -4766,7 +4766,7 @@
             <a:fld id="{B61BEF0D-F0BB-DE4B-95CE-6DB70DBA9567}" type="datetimeFigureOut">
               <a:rPr lang="en-US" dirty="0"/>
               <a:pPr/>
-              <a:t>7/9/2016</a:t>
+              <a:t>7/10/2016</a:t>
             </a:fld>
             <a:endParaRPr lang="en-US" dirty="0"/>
           </a:p>
@@ -5054,7 +5054,7 @@
             <a:fld id="{B61BEF0D-F0BB-DE4B-95CE-6DB70DBA9567}" type="datetimeFigureOut">
               <a:rPr lang="en-US" dirty="0"/>
               <a:pPr/>
-              <a:t>7/9/2016</a:t>
+              <a:t>7/10/2016</a:t>
             </a:fld>
             <a:endParaRPr lang="en-US" dirty="0"/>
           </a:p>
@@ -5581,7 +5581,7 @@
             <a:fld id="{B61BEF0D-F0BB-DE4B-95CE-6DB70DBA9567}" type="datetimeFigureOut">
               <a:rPr lang="en-US" dirty="0"/>
               <a:pPr/>
-              <a:t>7/9/2016</a:t>
+              <a:t>7/10/2016</a:t>
             </a:fld>
             <a:endParaRPr lang="en-US" dirty="0"/>
           </a:p>

</xml_diff>